<commit_message>
AutoML and MLCLI project added
</commit_message>
<xml_diff>
--- a/presentation/ML dotNET.pptx
+++ b/presentation/ML dotNET.pptx
@@ -28839,9 +28839,35 @@
             <a:endParaRPr lang="en-US" sz="1600" dirty="0"/>
           </a:p>
           <a:p>
+            <a:pPr marL="0" indent="0">
+              <a:buNone/>
+            </a:pPr>
+            <a:endParaRPr lang="en-US" sz="1600" dirty="0"/>
+          </a:p>
+          <a:p>
+            <a:pPr marL="0" indent="0">
+              <a:buNone/>
+            </a:pPr>
             <a:r>
               <a:rPr lang="en-US" sz="1600" dirty="0"/>
-              <a:t>Note: If you face error to install ML.Net extension even in your VS2019, then make sure you’re using latest version or try after uninstall and install again</a:t>
+              <a:t>** Note: If you face error to install ML.Net extension even in your VS2019, then make sure you’re using latest version or try after uninstall and install again.</a:t>
+            </a:r>
+          </a:p>
+          <a:p>
+            <a:pPr marL="0" indent="0">
+              <a:buNone/>
+            </a:pPr>
+            <a:r>
+              <a:rPr lang="en-US" sz="1600" dirty="0"/>
+              <a:t>** If you are using VS2019, do </a:t>
+            </a:r>
+            <a:r>
+              <a:rPr lang="en-US" sz="1600"/>
+              <a:t>not “Place </a:t>
+            </a:r>
+            <a:r>
+              <a:rPr lang="en-US" sz="1600" dirty="0"/>
+              <a:t>solution and project in the same directory”</a:t>
             </a:r>
           </a:p>
         </p:txBody>

</xml_diff>